<commit_message>
Fix pre demo (#2)
</commit_message>
<xml_diff>
--- a/slides/PsRuleForAzure.pptx
+++ b/slides/PsRuleForAzure.pptx
@@ -14,7 +14,7 @@
     <p:sldId id="284" r:id="rId5"/>
     <p:sldId id="288" r:id="rId6"/>
     <p:sldId id="287" r:id="rId7"/>
-    <p:sldId id="277" r:id="rId8"/>
+    <p:sldId id="289" r:id="rId8"/>
     <p:sldId id="283" r:id="rId9"/>
     <p:sldId id="273" r:id="rId10"/>
     <p:sldId id="272" r:id="rId11"/>
@@ -633,7 +633,7 @@
           </a:lstStyle>
           <a:p>
             <a:fld id="{6F33386D-D044-4CA4-BDFC-E7F39EF0D6ED}" type="datetimeFigureOut">
-              <a:t>22/07/2023</a:t>
+              <a:t>25/07/2023</a:t>
             </a:fld>
             <a:endParaRPr lang="it-IT"/>
           </a:p>
@@ -958,7 +958,10 @@
               <a:tabLst/>
               <a:defRPr/>
             </a:pPr>
-            <a:endParaRPr lang="it-IT" dirty="0"/>
+            <a:r>
+              <a:rPr lang="it-IT" dirty="0"/>
+              <a:t>Perché testare una infrastruttura cloud? Ha senso, e se sì in che modo?</a:t>
+            </a:r>
           </a:p>
         </p:txBody>
       </p:sp>
@@ -1064,17 +1067,20 @@
                 <a:effectLst/>
                 <a:latin typeface="Söhne"/>
               </a:rPr>
-              <a:t>Ci sono diverse ragioni per testare l'</a:t>
-            </a:r>
-            <a:r>
-              <a:rPr lang="it-IT" b="0" i="0" dirty="0" err="1">
+              <a:t>Per gli stessi motivi per i quali testiamo il nostro codice!</a:t>
+            </a:r>
+          </a:p>
+          <a:p>
+            <a:pPr algn="l"/>
+            <a:r>
+              <a:rPr lang="it-IT" b="1" i="0" dirty="0">
                 <a:solidFill>
                   <a:srgbClr val="D1D5DB"/>
                 </a:solidFill>
                 <a:effectLst/>
                 <a:latin typeface="Söhne"/>
               </a:rPr>
-              <a:t>infrastructure</a:t>
+              <a:t>Validazione</a:t>
             </a:r>
             <a:r>
               <a:rPr lang="it-IT" b="0" i="0" dirty="0">
@@ -1084,27 +1090,7 @@
                 <a:effectLst/>
                 <a:latin typeface="Söhne"/>
               </a:rPr>
-              <a:t> </a:t>
-            </a:r>
-            <a:r>
-              <a:rPr lang="it-IT" b="0" i="0" dirty="0" err="1">
-                <a:solidFill>
-                  <a:srgbClr val="D1D5DB"/>
-                </a:solidFill>
-                <a:effectLst/>
-                <a:latin typeface="Söhne"/>
-              </a:rPr>
-              <a:t>as</a:t>
-            </a:r>
-            <a:r>
-              <a:rPr lang="it-IT" b="0" i="0" dirty="0">
-                <a:solidFill>
-                  <a:srgbClr val="D1D5DB"/>
-                </a:solidFill>
-                <a:effectLst/>
-                <a:latin typeface="Söhne"/>
-              </a:rPr>
-              <a:t> code (</a:t>
+              <a:t>: Testare l'</a:t>
             </a:r>
             <a:r>
               <a:rPr lang="it-IT" b="0" i="0" dirty="0" err="1">
@@ -1124,7 +1110,7 @@
                 <a:effectLst/>
                 <a:latin typeface="Söhne"/>
               </a:rPr>
-              <a:t>)</a:t>
+              <a:t> consente di verificare che il codice scritto per definire l'infrastruttura sia corretto e produca il risultato desiderato. Ciò aiuta a rilevare errori, difetti o omissioni nel codice prima di implementarlo nell'ambiente di produzione.</a:t>
             </a:r>
           </a:p>
           <a:p>
@@ -1137,7 +1123,7 @@
                 <a:effectLst/>
                 <a:latin typeface="Söhne"/>
               </a:rPr>
-              <a:t>Validazione</a:t>
+              <a:t>Affidabilità</a:t>
             </a:r>
             <a:r>
               <a:rPr lang="it-IT" b="0" i="0" dirty="0">
@@ -1147,7 +1133,7 @@
                 <a:effectLst/>
                 <a:latin typeface="Söhne"/>
               </a:rPr>
-              <a:t>: Testare l'</a:t>
+              <a:t>: I test </a:t>
             </a:r>
             <a:r>
               <a:rPr lang="it-IT" b="0" i="0" dirty="0" err="1">
@@ -1167,11 +1153,27 @@
                 <a:effectLst/>
                 <a:latin typeface="Söhne"/>
               </a:rPr>
-              <a:t> consente di verificare che il codice scritto per definire l'infrastruttura sia corretto e produca il risultato desiderato. Ciò aiuta a rilevare errori, difetti o omissioni nel codice prima di implementarlo nell'ambiente di produzione.</a:t>
-            </a:r>
-          </a:p>
-          <a:p>
-            <a:pPr algn="l"/>
+              <a:t> aiutano a garantire che l'infrastruttura sia affidabile e coerente. Verificare che l'ambiente di infrastruttura soddisfi gli standard desiderati riduce il rischio di problemi imprevisti o di comportamenti indesiderati.</a:t>
+            </a:r>
+          </a:p>
+          <a:p>
+            <a:pPr marL="0" marR="0" lvl="0" indent="0" algn="l" defTabSz="914400" rtl="0" eaLnBrk="1" fontAlgn="auto" latinLnBrk="0" hangingPunct="1">
+              <a:lnSpc>
+                <a:spcPct val="100000"/>
+              </a:lnSpc>
+              <a:spcBef>
+                <a:spcPts val="0"/>
+              </a:spcBef>
+              <a:spcAft>
+                <a:spcPts val="0"/>
+              </a:spcAft>
+              <a:buClrTx/>
+              <a:buSzTx/>
+              <a:buFontTx/>
+              <a:buNone/>
+              <a:tabLst/>
+              <a:defRPr/>
+            </a:pPr>
             <a:r>
               <a:rPr lang="it-IT" b="1" i="0" dirty="0">
                 <a:solidFill>
@@ -1180,7 +1182,7 @@
                 <a:effectLst/>
                 <a:latin typeface="Söhne"/>
               </a:rPr>
-              <a:t>Affidabilità</a:t>
+              <a:t>Automazione</a:t>
             </a:r>
             <a:r>
               <a:rPr lang="it-IT" b="0" i="0" dirty="0">
@@ -1210,7 +1212,7 @@
                 <a:effectLst/>
                 <a:latin typeface="Söhne"/>
               </a:rPr>
-              <a:t> aiutano a garantire che l'infrastruttura sia affidabile e coerente. Verificare che l'ambiente di infrastruttura soddisfi gli standard desiderati riduce il rischio di problemi imprevisti o di comportamenti indesiderati.</a:t>
+              <a:t> possono essere automatizzati, consentendo di eseguire regolarmente i test senza la necessità di intervento manuale. Ciò semplifica il processo di verifica dell'infrastruttura e riduce il rischio di errori umani durante il processo di test.</a:t>
             </a:r>
           </a:p>
           <a:p>
@@ -1254,49 +1256,6 @@
                 <a:latin typeface="Söhne"/>
               </a:rPr>
               <a:t> consente di individuare problemi o difetti nel codice in modo tempestivo. Ciò consente di correggerli rapidamente, riducendo il tempo di sviluppo e consentendo il rilascio di infrastrutture in modo più efficiente.</a:t>
-            </a:r>
-          </a:p>
-          <a:p>
-            <a:pPr algn="l"/>
-            <a:r>
-              <a:rPr lang="it-IT" b="1" i="0" dirty="0">
-                <a:solidFill>
-                  <a:srgbClr val="D1D5DB"/>
-                </a:solidFill>
-                <a:effectLst/>
-                <a:latin typeface="Söhne"/>
-              </a:rPr>
-              <a:t>Automazione</a:t>
-            </a:r>
-            <a:r>
-              <a:rPr lang="it-IT" b="0" i="0" dirty="0">
-                <a:solidFill>
-                  <a:srgbClr val="D1D5DB"/>
-                </a:solidFill>
-                <a:effectLst/>
-                <a:latin typeface="Söhne"/>
-              </a:rPr>
-              <a:t>: I test </a:t>
-            </a:r>
-            <a:r>
-              <a:rPr lang="it-IT" b="0" i="0" dirty="0" err="1">
-                <a:solidFill>
-                  <a:srgbClr val="D1D5DB"/>
-                </a:solidFill>
-                <a:effectLst/>
-                <a:latin typeface="Söhne"/>
-              </a:rPr>
-              <a:t>IaC</a:t>
-            </a:r>
-            <a:r>
-              <a:rPr lang="it-IT" b="0" i="0" dirty="0">
-                <a:solidFill>
-                  <a:srgbClr val="D1D5DB"/>
-                </a:solidFill>
-                <a:effectLst/>
-                <a:latin typeface="Söhne"/>
-              </a:rPr>
-              <a:t> possono essere automatizzati, consentendo di eseguire regolarmente i test senza la necessità di intervento manuale. Ciò semplifica il processo di verifica dell'infrastruttura e riduce il rischio di errori umani durante il processo di test.</a:t>
             </a:r>
           </a:p>
         </p:txBody>
@@ -1390,7 +1349,15 @@
             </a:pPr>
             <a:r>
               <a:rPr lang="it-IT" dirty="0"/>
-              <a:t>WAF sono un insieme di regole</a:t>
+              <a:t>Come testiamo l’</a:t>
+            </a:r>
+            <a:r>
+              <a:rPr lang="it-IT" dirty="0" err="1"/>
+              <a:t>IaC</a:t>
+            </a:r>
+            <a:r>
+              <a:rPr lang="it-IT" dirty="0"/>
+              <a:t> in un contesto Azure?</a:t>
             </a:r>
             <a:endParaRPr dirty="0"/>
           </a:p>
@@ -1642,97 +1609,10 @@
           <a:bodyPr/>
           <a:lstStyle/>
           <a:p>
-            <a:pPr marL="0" marR="0" lvl="0" indent="0" algn="l" defTabSz="914400" rtl="0" eaLnBrk="1" fontAlgn="auto" latinLnBrk="0" hangingPunct="1">
-              <a:lnSpc>
-                <a:spcPct val="100000"/>
-              </a:lnSpc>
-              <a:spcBef>
-                <a:spcPts val="0"/>
-              </a:spcBef>
-              <a:spcAft>
-                <a:spcPts val="0"/>
-              </a:spcAft>
-              <a:buClrTx/>
-              <a:buSzTx/>
-              <a:buFontTx/>
-              <a:buNone/>
-              <a:tabLst/>
-              <a:defRPr/>
-            </a:pPr>
-            <a:r>
-              <a:rPr lang="it-IT" sz="1200" b="0" dirty="0"/>
-              <a:t>Supporta Azure Resource Template e </a:t>
-            </a:r>
-            <a:r>
-              <a:rPr lang="it-IT" sz="1200" b="0" dirty="0" err="1"/>
-              <a:t>Bicep</a:t>
-            </a:r>
-            <a:r>
-              <a:rPr lang="it-IT" sz="1200" b="0" dirty="0">
-                <a:solidFill>
-                  <a:srgbClr val="333333"/>
-                </a:solidFill>
-                <a:latin typeface="Roboto" panose="02000000000000000000" pitchFamily="2" charset="0"/>
-                <a:ea typeface="Roboto" panose="02000000000000000000" pitchFamily="2" charset="0"/>
-                <a:cs typeface="Roboto" panose="02000000000000000000" pitchFamily="2" charset="0"/>
-              </a:rPr>
-              <a:t>, contiene 340+ regole predefinite</a:t>
-            </a:r>
-            <a:r>
-              <a:rPr lang="it-IT" sz="1100" b="0" dirty="0">
-                <a:solidFill>
-                  <a:srgbClr val="333333"/>
-                </a:solidFill>
-                <a:latin typeface="Roboto" panose="02000000000000000000" pitchFamily="2" charset="0"/>
-                <a:ea typeface="Roboto" panose="02000000000000000000" pitchFamily="2" charset="0"/>
-                <a:cs typeface="Roboto" panose="02000000000000000000" pitchFamily="2" charset="0"/>
-              </a:rPr>
-              <a:t>	</a:t>
-            </a:r>
-            <a:endParaRPr lang="it-IT" sz="1600" b="0" dirty="0">
-              <a:solidFill>
-                <a:srgbClr val="333333"/>
-              </a:solidFill>
-              <a:latin typeface="Roboto" panose="02000000000000000000" pitchFamily="2" charset="0"/>
-              <a:ea typeface="Roboto" panose="02000000000000000000" pitchFamily="2" charset="0"/>
-              <a:cs typeface="Roboto" panose="02000000000000000000" pitchFamily="2" charset="0"/>
-            </a:endParaRPr>
-          </a:p>
-          <a:p>
-            <a:endParaRPr lang="it-IT" dirty="0"/>
-          </a:p>
-          <a:p>
-            <a:r>
-              <a:rPr lang="it-IT" sz="1200" b="0" dirty="0"/>
-              <a:t>Supporta GitHub Actions e Azure Pipelines + possibile utilizzare il modulo </a:t>
-            </a:r>
-            <a:r>
-              <a:rPr lang="it-IT" sz="1200" b="0" dirty="0" err="1"/>
-              <a:t>powershell</a:t>
-            </a:r>
-            <a:r>
-              <a:rPr lang="it-IT" sz="1200" b="0" dirty="0"/>
-              <a:t> e quindi utilizzarlo con altri strumenti di CI/CD =&gt; </a:t>
-            </a:r>
-            <a:r>
-              <a:rPr lang="it-IT" sz="1200" b="0"/>
-              <a:t>crossplatform</a:t>
-            </a:r>
-            <a:endParaRPr lang="it-IT" sz="1200" b="0" dirty="0"/>
-          </a:p>
-          <a:p>
-            <a:endParaRPr lang="it-IT" sz="1200" b="0" dirty="0"/>
-          </a:p>
-          <a:p>
-            <a:r>
-              <a:rPr lang="it-IT" sz="1200" b="0" dirty="0" err="1"/>
-              <a:t>Devops</a:t>
-            </a:r>
-            <a:r>
-              <a:rPr lang="it-IT" sz="1200" b="0" dirty="0"/>
-              <a:t>: le risorse possono essere convalidate durante l’intero ciclo di vita e possono essere monitorate costantemente</a:t>
-            </a:r>
-            <a:endParaRPr lang="it-IT" dirty="0"/>
+            <a:r>
+              <a:rPr lang="it-IT" dirty="0"/>
+              <a:t>Ci fornisce una panoramica della situazione delle nostre risorse</a:t>
+            </a:r>
           </a:p>
         </p:txBody>
       </p:sp>
@@ -1753,7 +1633,7 @@
           <a:p>
             <a:fld id="{26E40D21-FCAA-4F5E-B248-D596B0DB439A}" type="slidenum">
               <a:rPr lang="it-IT" smtClean="0"/>
-              <a:t>6</a:t>
+              <a:t>5</a:t>
             </a:fld>
             <a:endParaRPr lang="it-IT"/>
           </a:p>
@@ -1762,7 +1642,7 @@
     </p:spTree>
     <p:extLst>
       <p:ext uri="{BB962C8B-B14F-4D97-AF65-F5344CB8AC3E}">
-        <p14:creationId xmlns:p14="http://schemas.microsoft.com/office/powerpoint/2010/main" val="746233113"/>
+        <p14:creationId xmlns:p14="http://schemas.microsoft.com/office/powerpoint/2010/main" val="813475420"/>
       </p:ext>
     </p:extLst>
   </p:cSld>
@@ -1816,6 +1696,211 @@
           <a:bodyPr/>
           <a:lstStyle/>
           <a:p>
+            <a:pPr marL="0" marR="0" lvl="0" indent="0" algn="l" defTabSz="914400" rtl="0" eaLnBrk="1" fontAlgn="auto" latinLnBrk="0" hangingPunct="1">
+              <a:lnSpc>
+                <a:spcPct val="100000"/>
+              </a:lnSpc>
+              <a:spcBef>
+                <a:spcPts val="0"/>
+              </a:spcBef>
+              <a:spcAft>
+                <a:spcPts val="0"/>
+              </a:spcAft>
+              <a:buClrTx/>
+              <a:buSzTx/>
+              <a:buFontTx/>
+              <a:buNone/>
+              <a:tabLst/>
+              <a:defRPr/>
+            </a:pPr>
+            <a:r>
+              <a:rPr lang="it-IT" sz="1200" b="0" dirty="0"/>
+              <a:t>È un modulo di </a:t>
+            </a:r>
+            <a:r>
+              <a:rPr lang="it-IT" sz="1200" b="0" dirty="0" err="1"/>
+              <a:t>PSRule</a:t>
+            </a:r>
+            <a:r>
+              <a:rPr lang="it-IT" sz="1200" b="0" dirty="0"/>
+              <a:t> =&gt; è una libreria che permette di validare l’infrastruttura cloud attraverso regole (test)</a:t>
+            </a:r>
+          </a:p>
+          <a:p>
+            <a:pPr marL="0" marR="0" lvl="0" indent="0" algn="l" defTabSz="914400" rtl="0" eaLnBrk="1" fontAlgn="auto" latinLnBrk="0" hangingPunct="1">
+              <a:lnSpc>
+                <a:spcPct val="100000"/>
+              </a:lnSpc>
+              <a:spcBef>
+                <a:spcPts val="0"/>
+              </a:spcBef>
+              <a:spcAft>
+                <a:spcPts val="0"/>
+              </a:spcAft>
+              <a:buClrTx/>
+              <a:buSzTx/>
+              <a:buFontTx/>
+              <a:buNone/>
+              <a:tabLst/>
+              <a:defRPr/>
+            </a:pPr>
+            <a:r>
+              <a:rPr lang="it-IT" sz="1200" b="0" dirty="0"/>
+              <a:t>Supporta Azure Resource Template e </a:t>
+            </a:r>
+            <a:r>
+              <a:rPr lang="it-IT" sz="1200" b="0" dirty="0" err="1"/>
+              <a:t>Bicep</a:t>
+            </a:r>
+            <a:r>
+              <a:rPr lang="it-IT" sz="1200" b="0" dirty="0">
+                <a:solidFill>
+                  <a:srgbClr val="333333"/>
+                </a:solidFill>
+                <a:latin typeface="Roboto" panose="02000000000000000000" pitchFamily="2" charset="0"/>
+                <a:ea typeface="Roboto" panose="02000000000000000000" pitchFamily="2" charset="0"/>
+                <a:cs typeface="Roboto" panose="02000000000000000000" pitchFamily="2" charset="0"/>
+              </a:rPr>
+              <a:t>, contiene 340+ regole predefinite</a:t>
+            </a:r>
+            <a:r>
+              <a:rPr lang="it-IT" sz="1100" b="0" dirty="0">
+                <a:solidFill>
+                  <a:srgbClr val="333333"/>
+                </a:solidFill>
+                <a:latin typeface="Roboto" panose="02000000000000000000" pitchFamily="2" charset="0"/>
+                <a:ea typeface="Roboto" panose="02000000000000000000" pitchFamily="2" charset="0"/>
+                <a:cs typeface="Roboto" panose="02000000000000000000" pitchFamily="2" charset="0"/>
+              </a:rPr>
+              <a:t>	</a:t>
+            </a:r>
+            <a:endParaRPr lang="it-IT" sz="1600" b="0" dirty="0">
+              <a:solidFill>
+                <a:srgbClr val="333333"/>
+              </a:solidFill>
+              <a:latin typeface="Roboto" panose="02000000000000000000" pitchFamily="2" charset="0"/>
+              <a:ea typeface="Roboto" panose="02000000000000000000" pitchFamily="2" charset="0"/>
+              <a:cs typeface="Roboto" panose="02000000000000000000" pitchFamily="2" charset="0"/>
+            </a:endParaRPr>
+          </a:p>
+          <a:p>
+            <a:endParaRPr lang="it-IT" dirty="0"/>
+          </a:p>
+          <a:p>
+            <a:r>
+              <a:rPr lang="it-IT" sz="1200" b="0" dirty="0"/>
+              <a:t>Supporta GitHub Actions e Azure Pipelines + possibile utilizzare il modulo </a:t>
+            </a:r>
+            <a:r>
+              <a:rPr lang="it-IT" sz="1200" b="0" dirty="0" err="1"/>
+              <a:t>powershell</a:t>
+            </a:r>
+            <a:r>
+              <a:rPr lang="it-IT" sz="1200" b="0" dirty="0"/>
+              <a:t> e quindi utilizzarlo con altri strumenti di CI/CD =&gt; </a:t>
+            </a:r>
+            <a:r>
+              <a:rPr lang="it-IT" sz="1200" b="0" dirty="0" err="1"/>
+              <a:t>crossplatform</a:t>
+            </a:r>
+            <a:endParaRPr lang="it-IT" sz="1200" b="0" dirty="0"/>
+          </a:p>
+          <a:p>
+            <a:endParaRPr lang="it-IT" sz="1200" b="0" dirty="0"/>
+          </a:p>
+          <a:p>
+            <a:r>
+              <a:rPr lang="it-IT" sz="1200" b="0" dirty="0" err="1"/>
+              <a:t>Devops</a:t>
+            </a:r>
+            <a:r>
+              <a:rPr lang="it-IT" sz="1200" b="0" dirty="0"/>
+              <a:t>: le risorse possono essere convalidate durante l’intero ciclo di vita e possono essere monitorate costantemente</a:t>
+            </a:r>
+            <a:endParaRPr lang="it-IT" dirty="0"/>
+          </a:p>
+        </p:txBody>
+      </p:sp>
+      <p:sp>
+        <p:nvSpPr>
+          <p:cNvPr id="4" name="Segnaposto numero diapositiva 3"/>
+          <p:cNvSpPr>
+            <a:spLocks noGrp="1"/>
+          </p:cNvSpPr>
+          <p:nvPr>
+            <p:ph type="sldNum" sz="quarter" idx="5"/>
+          </p:nvPr>
+        </p:nvSpPr>
+        <p:spPr/>
+        <p:txBody>
+          <a:bodyPr/>
+          <a:lstStyle/>
+          <a:p>
+            <a:fld id="{26E40D21-FCAA-4F5E-B248-D596B0DB439A}" type="slidenum">
+              <a:rPr lang="it-IT" smtClean="0"/>
+              <a:t>6</a:t>
+            </a:fld>
+            <a:endParaRPr lang="it-IT"/>
+          </a:p>
+        </p:txBody>
+      </p:sp>
+    </p:spTree>
+    <p:extLst>
+      <p:ext uri="{BB962C8B-B14F-4D97-AF65-F5344CB8AC3E}">
+        <p14:creationId xmlns:p14="http://schemas.microsoft.com/office/powerpoint/2010/main" val="746233113"/>
+      </p:ext>
+    </p:extLst>
+  </p:cSld>
+  <p:clrMapOvr>
+    <a:masterClrMapping/>
+  </p:clrMapOvr>
+</p:notes>
+</file>
+
+<file path=ppt/notesSlides/notesSlide7.xml><?xml version="1.0" encoding="utf-8"?>
+<p:notes xmlns:a="http://schemas.openxmlformats.org/drawingml/2006/main" xmlns:r="http://schemas.openxmlformats.org/officeDocument/2006/relationships" xmlns:p="http://schemas.openxmlformats.org/presentationml/2006/main">
+  <p:cSld>
+    <p:spTree>
+      <p:nvGrpSpPr>
+        <p:cNvPr id="1" name=""/>
+        <p:cNvGrpSpPr/>
+        <p:nvPr/>
+      </p:nvGrpSpPr>
+      <p:grpSpPr>
+        <a:xfrm>
+          <a:off x="0" y="0"/>
+          <a:ext cx="0" cy="0"/>
+          <a:chOff x="0" y="0"/>
+          <a:chExt cx="0" cy="0"/>
+        </a:xfrm>
+      </p:grpSpPr>
+      <p:sp>
+        <p:nvSpPr>
+          <p:cNvPr id="2" name="Segnaposto immagine diapositiva 1"/>
+          <p:cNvSpPr>
+            <a:spLocks noGrp="1" noRot="1" noChangeAspect="1"/>
+          </p:cNvSpPr>
+          <p:nvPr>
+            <p:ph type="sldImg"/>
+          </p:nvPr>
+        </p:nvSpPr>
+        <p:spPr/>
+      </p:sp>
+      <p:sp>
+        <p:nvSpPr>
+          <p:cNvPr id="3" name="Segnaposto note 2"/>
+          <p:cNvSpPr>
+            <a:spLocks noGrp="1"/>
+          </p:cNvSpPr>
+          <p:nvPr>
+            <p:ph type="body" idx="1"/>
+          </p:nvPr>
+        </p:nvSpPr>
+        <p:spPr/>
+        <p:txBody>
+          <a:bodyPr/>
+          <a:lstStyle/>
+          <a:p>
             <a:endParaRPr lang="it-IT" dirty="0"/>
           </a:p>
         </p:txBody>
@@ -1856,7 +1941,7 @@
 </p:notes>
 </file>
 
-<file path=ppt/notesSlides/notesSlide7.xml><?xml version="1.0" encoding="utf-8"?>
+<file path=ppt/notesSlides/notesSlide8.xml><?xml version="1.0" encoding="utf-8"?>
 <p:notes xmlns:a="http://schemas.openxmlformats.org/drawingml/2006/main" xmlns:r="http://schemas.openxmlformats.org/officeDocument/2006/relationships" xmlns:p="http://schemas.openxmlformats.org/presentationml/2006/main" showMasterSp="0" showMasterPhAnim="0">
   <p:cSld>
     <p:spTree>
@@ -2091,7 +2176,7 @@
           <a:p>
             <a:fld id="{F64A8E5F-40E5-4553-9F3C-699F1A5B8145}" type="datetimeFigureOut">
               <a:rPr lang="de-DE" smtClean="0"/>
-              <a:t>22.07.2023</a:t>
+              <a:t>25.07.2023</a:t>
             </a:fld>
             <a:endParaRPr lang="de-DE"/>
           </a:p>
@@ -2261,7 +2346,7 @@
           <a:p>
             <a:fld id="{F64A8E5F-40E5-4553-9F3C-699F1A5B8145}" type="datetimeFigureOut">
               <a:rPr lang="de-DE" smtClean="0"/>
-              <a:t>22.07.2023</a:t>
+              <a:t>25.07.2023</a:t>
             </a:fld>
             <a:endParaRPr lang="de-DE"/>
           </a:p>
@@ -2441,7 +2526,7 @@
           <a:p>
             <a:fld id="{F64A8E5F-40E5-4553-9F3C-699F1A5B8145}" type="datetimeFigureOut">
               <a:rPr lang="de-DE" smtClean="0"/>
-              <a:t>22.07.2023</a:t>
+              <a:t>25.07.2023</a:t>
             </a:fld>
             <a:endParaRPr lang="de-DE"/>
           </a:p>
@@ -3191,7 +3276,7 @@
           <a:p>
             <a:fld id="{F64A8E5F-40E5-4553-9F3C-699F1A5B8145}" type="datetimeFigureOut">
               <a:rPr lang="de-DE" smtClean="0"/>
-              <a:t>22.07.2023</a:t>
+              <a:t>25.07.2023</a:t>
             </a:fld>
             <a:endParaRPr lang="de-DE"/>
           </a:p>
@@ -3437,7 +3522,7 @@
           <a:p>
             <a:fld id="{F64A8E5F-40E5-4553-9F3C-699F1A5B8145}" type="datetimeFigureOut">
               <a:rPr lang="de-DE" smtClean="0"/>
-              <a:t>22.07.2023</a:t>
+              <a:t>25.07.2023</a:t>
             </a:fld>
             <a:endParaRPr lang="de-DE"/>
           </a:p>
@@ -3669,7 +3754,7 @@
           <a:p>
             <a:fld id="{F64A8E5F-40E5-4553-9F3C-699F1A5B8145}" type="datetimeFigureOut">
               <a:rPr lang="de-DE" smtClean="0"/>
-              <a:t>22.07.2023</a:t>
+              <a:t>25.07.2023</a:t>
             </a:fld>
             <a:endParaRPr lang="de-DE"/>
           </a:p>
@@ -4036,7 +4121,7 @@
           <a:p>
             <a:fld id="{F64A8E5F-40E5-4553-9F3C-699F1A5B8145}" type="datetimeFigureOut">
               <a:rPr lang="de-DE" smtClean="0"/>
-              <a:t>22.07.2023</a:t>
+              <a:t>25.07.2023</a:t>
             </a:fld>
             <a:endParaRPr lang="de-DE"/>
           </a:p>
@@ -4154,7 +4239,7 @@
           <a:p>
             <a:fld id="{F64A8E5F-40E5-4553-9F3C-699F1A5B8145}" type="datetimeFigureOut">
               <a:rPr lang="de-DE" smtClean="0"/>
-              <a:t>22.07.2023</a:t>
+              <a:t>25.07.2023</a:t>
             </a:fld>
             <a:endParaRPr lang="de-DE"/>
           </a:p>
@@ -4249,7 +4334,7 @@
           <a:p>
             <a:fld id="{F64A8E5F-40E5-4553-9F3C-699F1A5B8145}" type="datetimeFigureOut">
               <a:rPr lang="de-DE" smtClean="0"/>
-              <a:t>22.07.2023</a:t>
+              <a:t>25.07.2023</a:t>
             </a:fld>
             <a:endParaRPr lang="de-DE"/>
           </a:p>
@@ -4526,7 +4611,7 @@
           <a:p>
             <a:fld id="{F64A8E5F-40E5-4553-9F3C-699F1A5B8145}" type="datetimeFigureOut">
               <a:rPr lang="de-DE" smtClean="0"/>
-              <a:t>22.07.2023</a:t>
+              <a:t>25.07.2023</a:t>
             </a:fld>
             <a:endParaRPr lang="de-DE"/>
           </a:p>
@@ -4779,7 +4864,7 @@
           <a:p>
             <a:fld id="{F64A8E5F-40E5-4553-9F3C-699F1A5B8145}" type="datetimeFigureOut">
               <a:rPr lang="de-DE" smtClean="0"/>
-              <a:t>22.07.2023</a:t>
+              <a:t>25.07.2023</a:t>
             </a:fld>
             <a:endParaRPr lang="de-DE"/>
           </a:p>
@@ -4992,7 +5077,7 @@
           <a:p>
             <a:fld id="{F64A8E5F-40E5-4553-9F3C-699F1A5B8145}" type="datetimeFigureOut">
               <a:rPr lang="de-DE" smtClean="0"/>
-              <a:t>22.07.2023</a:t>
+              <a:t>25.07.2023</a:t>
             </a:fld>
             <a:endParaRPr lang="de-DE"/>
           </a:p>
@@ -7000,6 +7085,11 @@
             <a:avLst/>
           </a:prstGeom>
           <a:noFill/>
+          <a:ln>
+            <a:solidFill>
+              <a:srgbClr val="E9E200"/>
+            </a:solidFill>
+          </a:ln>
           <a:extLst>
             <a:ext uri="{909E8E84-426E-40DD-AFC4-6F175D3DCCD1}">
               <a14:hiddenFill xmlns:a14="http://schemas.microsoft.com/office/drawing/2010/main">
@@ -7132,7 +7222,7 @@
           <p:nvPr/>
         </p:nvPicPr>
         <p:blipFill>
-          <a:blip r:embed="rId2" cstate="print">
+          <a:blip r:embed="rId3" cstate="print">
             <a:extLst>
               <a:ext uri="{28A0092B-C50C-407E-A947-70E740481C1C}">
                 <a14:useLocalDpi xmlns:a14="http://schemas.microsoft.com/office/drawing/2010/main" val="0"/>
@@ -7153,6 +7243,11 @@
             <a:avLst/>
           </a:prstGeom>
           <a:noFill/>
+          <a:ln>
+            <a:solidFill>
+              <a:srgbClr val="E9E200"/>
+            </a:solidFill>
+          </a:ln>
           <a:extLst>
             <a:ext uri="{909E8E84-426E-40DD-AFC4-6F175D3DCCD1}">
               <a14:hiddenFill xmlns:a14="http://schemas.microsoft.com/office/drawing/2010/main">
@@ -7320,18 +7415,19 @@
           <a:p>
             <a:r>
               <a:rPr lang="it-IT" sz="2800" b="0" dirty="0"/>
-              <a:t>È un set predefinito e pronto all’uso di test e documentazione</a:t>
-            </a:r>
-            <a:endParaRPr lang="it-IT" sz="2800" b="0" dirty="0">
-              <a:solidFill>
-                <a:srgbClr val="333333"/>
-              </a:solidFill>
-              <a:latin typeface="Roboto" panose="02000000000000000000" pitchFamily="2" charset="0"/>
-              <a:ea typeface="Roboto" panose="02000000000000000000" pitchFamily="2" charset="0"/>
-              <a:cs typeface="Roboto" panose="02000000000000000000" pitchFamily="2" charset="0"/>
-            </a:endParaRPr>
-          </a:p>
-          <a:p>
+              <a:t>Basato su </a:t>
+            </a:r>
+            <a:r>
+              <a:rPr lang="it-IT" sz="2800" b="0" dirty="0" err="1"/>
+              <a:t>PowerShell</a:t>
+            </a:r>
+            <a:endParaRPr lang="it-IT" sz="2800" b="0" dirty="0"/>
+          </a:p>
+          <a:p>
+            <a:r>
+              <a:rPr lang="it-IT" sz="2800" b="0" dirty="0"/>
+              <a:t>È un set predefinito e pronto all’uso di test e documentazione c</a:t>
+            </a:r>
             <a:r>
               <a:rPr lang="it-IT" sz="2800" b="0" dirty="0">
                 <a:solidFill>
@@ -7341,7 +7437,7 @@
                 <a:ea typeface="Roboto" panose="02000000000000000000" pitchFamily="2" charset="0"/>
                 <a:cs typeface="Roboto" panose="02000000000000000000" pitchFamily="2" charset="0"/>
               </a:rPr>
-              <a:t>Conforme al </a:t>
+              <a:t>onforme al </a:t>
             </a:r>
             <a:r>
               <a:rPr lang="it-IT" sz="2800" b="0" dirty="0" err="1">
@@ -7420,17 +7516,6 @@
           <a:p>
             <a:r>
               <a:rPr lang="it-IT" sz="2800" b="0" dirty="0"/>
-              <a:t>Basato su </a:t>
-            </a:r>
-            <a:r>
-              <a:rPr lang="it-IT" sz="2800" b="0" dirty="0" err="1"/>
-              <a:t>PowerShell</a:t>
-            </a:r>
-            <a:endParaRPr lang="it-IT" sz="2800" b="0" dirty="0"/>
-          </a:p>
-          <a:p>
-            <a:r>
-              <a:rPr lang="it-IT" sz="2800" b="0" dirty="0"/>
               <a:t>Possibilità di aggiungere regole personalizzate</a:t>
             </a:r>
           </a:p>
@@ -7443,18 +7528,18 @@
           <a:p>
             <a:pPr lvl="1"/>
             <a:r>
-              <a:rPr lang="it-IT" sz="2267" b="0" dirty="0" err="1"/>
+              <a:rPr lang="it-IT" sz="2400" b="0" dirty="0" err="1"/>
               <a:t>Pre</a:t>
             </a:r>
             <a:r>
-              <a:rPr lang="it-IT" sz="2267" b="0" dirty="0"/>
+              <a:rPr lang="it-IT" sz="2400" b="0" dirty="0"/>
               <a:t>-Flight</a:t>
             </a:r>
           </a:p>
           <a:p>
             <a:pPr lvl="1"/>
             <a:r>
-              <a:rPr lang="it-IT" sz="2267" b="0" dirty="0"/>
+              <a:rPr lang="it-IT" sz="2400" b="0" dirty="0"/>
               <a:t>In-Flight</a:t>
             </a:r>
           </a:p>
@@ -7570,10 +7655,10 @@
       </p:sp>
       <p:pic>
         <p:nvPicPr>
-          <p:cNvPr id="4" name="Immagine 3">
+          <p:cNvPr id="5" name="Immagine 4">
             <a:extLst>
               <a:ext uri="{FF2B5EF4-FFF2-40B4-BE49-F238E27FC236}">
-                <a16:creationId xmlns:a16="http://schemas.microsoft.com/office/drawing/2014/main" id="{16B4E2A0-C2C1-E4F5-431C-1BF6F54B58C6}"/>
+                <a16:creationId xmlns:a16="http://schemas.microsoft.com/office/drawing/2014/main" id="{9993EA2E-D410-7FED-FEAD-AF28509F7A02}"/>
               </a:ext>
             </a:extLst>
           </p:cNvPr>
@@ -7582,32 +7667,79 @@
           </p:cNvPicPr>
           <p:nvPr/>
         </p:nvPicPr>
-        <p:blipFill>
-          <a:blip r:embed="rId2">
-            <a:extLst>
-              <a:ext uri="{28A0092B-C50C-407E-A947-70E740481C1C}">
-                <a14:useLocalDpi xmlns:a14="http://schemas.microsoft.com/office/drawing/2010/main" val="0"/>
-              </a:ext>
-            </a:extLst>
-          </a:blip>
-          <a:stretch>
-            <a:fillRect/>
-          </a:stretch>
+        <p:blipFill rotWithShape="1">
+          <a:blip r:embed="rId2"/>
+          <a:srcRect t="16944" b="27481"/>
+          <a:stretch/>
         </p:blipFill>
         <p:spPr>
           <a:xfrm>
-            <a:off x="3744824" y="1983908"/>
-            <a:ext cx="4702352" cy="4702352"/>
+            <a:off x="4182369" y="1944397"/>
+            <a:ext cx="3827261" cy="4726718"/>
           </a:xfrm>
           <a:prstGeom prst="rect">
             <a:avLst/>
           </a:prstGeom>
+          <a:ln>
+            <a:solidFill>
+              <a:srgbClr val="E9E200"/>
+            </a:solidFill>
+          </a:ln>
         </p:spPr>
       </p:pic>
+      <p:sp>
+        <p:nvSpPr>
+          <p:cNvPr id="6" name="CasellaDiTesto 5">
+            <a:extLst>
+              <a:ext uri="{FF2B5EF4-FFF2-40B4-BE49-F238E27FC236}">
+                <a16:creationId xmlns:a16="http://schemas.microsoft.com/office/drawing/2014/main" id="{CE3659B3-2E77-0435-E4A7-87BD245C4EF2}"/>
+              </a:ext>
+            </a:extLst>
+          </p:cNvPr>
+          <p:cNvSpPr txBox="1"/>
+          <p:nvPr/>
+        </p:nvSpPr>
+        <p:spPr>
+          <a:xfrm>
+            <a:off x="8066213" y="5717008"/>
+            <a:ext cx="2463528" cy="954107"/>
+          </a:xfrm>
+          <a:prstGeom prst="rect">
+            <a:avLst/>
+          </a:prstGeom>
+          <a:noFill/>
+        </p:spPr>
+        <p:txBody>
+          <a:bodyPr wrap="square" rtlCol="0">
+            <a:spAutoFit/>
+          </a:bodyPr>
+          <a:lstStyle/>
+          <a:p>
+            <a:r>
+              <a:rPr lang="it-IT" sz="1400" b="1" dirty="0"/>
+              <a:t>DISCLAIMER:</a:t>
+            </a:r>
+          </a:p>
+          <a:p>
+            <a:r>
+              <a:rPr lang="it-IT" sz="1400" dirty="0"/>
+              <a:t>Nessun </a:t>
+            </a:r>
+            <a:r>
+              <a:rPr lang="it-IT" sz="1400" dirty="0" err="1"/>
+              <a:t>corgi</a:t>
+            </a:r>
+            <a:r>
+              <a:rPr lang="it-IT" sz="1400" dirty="0"/>
+              <a:t> è stato maltrattato per ottenere questa immagine</a:t>
+            </a:r>
+          </a:p>
+        </p:txBody>
+      </p:sp>
     </p:spTree>
     <p:extLst>
       <p:ext uri="{BB962C8B-B14F-4D97-AF65-F5344CB8AC3E}">
-        <p14:creationId xmlns:p14="http://schemas.microsoft.com/office/powerpoint/2010/main" val="573343634"/>
+        <p14:creationId xmlns:p14="http://schemas.microsoft.com/office/powerpoint/2010/main" val="2797986231"/>
       </p:ext>
     </p:extLst>
   </p:cSld>
@@ -7716,6 +7848,23 @@
               </a:rPr>
               <a:t>https://www.youtube.com/@BernieAWhite</a:t>
             </a:r>
+            <a:endParaRPr lang="it-IT" dirty="0"/>
+          </a:p>
+          <a:p>
+            <a:endParaRPr lang="it-IT" dirty="0">
+              <a:hlinkClick r:id="rId7"/>
+            </a:endParaRPr>
+          </a:p>
+          <a:p>
+            <a:r>
+              <a:rPr lang="it-IT" dirty="0">
+                <a:hlinkClick r:id="rId7"/>
+              </a:rPr>
+              <a:t>https://github.com/render93/Blexin.BrownBagSession.PsRuleForAzure</a:t>
+            </a:r>
+            <a:endParaRPr lang="it-IT" dirty="0"/>
+          </a:p>
+          <a:p>
             <a:endParaRPr lang="it-IT" dirty="0"/>
           </a:p>
           <a:p>

</xml_diff>